<commit_message>
Update README: add clickable buttons and tech stack icons
</commit_message>
<xml_diff>
--- a/presentation - Project.pptx
+++ b/presentation - Project.pptx
@@ -733,22 +733,21 @@
             </a:pPr>
             <a:r>
               <a:rPr lang="fr-FR" dirty="0"/>
-              <a:t>Bonjour, je vais vous présenter mon projet final intitulé </a:t>
-            </a:r>
-            <a:r>
-              <a:rPr lang="fr-FR" i="1" dirty="0"/>
-              <a:t>Amazon – Analyse des avis produits</a:t>
-            </a:r>
-            <a:r>
-              <a:rPr lang="fr-FR" dirty="0"/>
-              <a:t>.</a:t>
+              <a:t>« Bonjour, je m’appelle Ismaël Sylla.</a:t>
             </a:r>
             <a:br>
               <a:rPr lang="fr-FR" dirty="0"/>
             </a:br>
             <a:r>
               <a:rPr lang="fr-FR" dirty="0"/>
-              <a:t>Il s’agit d’un projet data complet, que j’ai mené comme un projet professionnel, de l’analyse du besoin jusqu’à la gouvernance et l’exploitation des données.</a:t>
+              <a:t>Cette soutenance porte sur un projet Data Engineering et analyse avancée autour de l’analyse des avis produits Amazon.</a:t>
+            </a:r>
+            <a:br>
+              <a:rPr lang="fr-FR" dirty="0"/>
+            </a:br>
+            <a:r>
+              <a:rPr lang="fr-FR" dirty="0"/>
+              <a:t>Il s’agit d’un projet mené comme un projet professionnel réel, couvrant l’ensemble du cycle de vie d’une solution data, depuis l’analyse du besoin jusqu’à la gouvernance et la mise en production. »</a:t>
             </a:r>
             <a:endParaRPr dirty="0"/>
           </a:p>
@@ -882,6 +881,28 @@
             <a:r>
               <a:rPr lang="fr-FR" dirty="0"/>
               <a:t>Les avis clients constituent une source d’information précieuse pour améliorer l’expérience utilisateur et la performance produit.</a:t>
+            </a:r>
+          </a:p>
+          <a:p>
+            <a:pPr marL="0" lvl="0" indent="0" algn="l" rtl="0">
+              <a:spcBef>
+                <a:spcPts val="0"/>
+              </a:spcBef>
+              <a:spcAft>
+                <a:spcPts val="0"/>
+              </a:spcAft>
+              <a:buNone/>
+            </a:pPr>
+            <a:r>
+              <a:rPr lang="fr-FR" dirty="0"/>
+              <a:t>L’écosystème data extrêmement complexe et à très grande échelle.</a:t>
+            </a:r>
+            <a:br>
+              <a:rPr lang="fr-FR" dirty="0"/>
+            </a:br>
+            <a:r>
+              <a:rPr lang="fr-FR" dirty="0"/>
+              <a:t>Les avis clients sont un levier clé de performance, mais aussi un risque s’ils sont mal exploités</a:t>
             </a:r>
             <a:endParaRPr dirty="0"/>
           </a:p>
@@ -1012,7 +1033,21 @@
             </a:pPr>
             <a:r>
               <a:rPr lang="fr-FR" dirty="0"/>
-              <a:t>Cette analyse stratégique met en évidence que la valorisation des avis clients représente une opportunité forte, mais également un enjeu de maîtrise et de confiance.</a:t>
+              <a:t>Cette analyse SWOT permet de comprendre pourquoi ce projet est pertinent.</a:t>
+            </a:r>
+            <a:br>
+              <a:rPr lang="fr-FR" dirty="0"/>
+            </a:br>
+            <a:r>
+              <a:rPr lang="fr-FR" dirty="0"/>
+              <a:t>Les forces reposent sur la puissance technologique d’Amazon, tandis que les faiblesses et menaces mettent en évidence les enjeux de confiance et de réglementation.</a:t>
+            </a:r>
+            <a:br>
+              <a:rPr lang="fr-FR" dirty="0"/>
+            </a:br>
+            <a:r>
+              <a:rPr lang="fr-FR" dirty="0"/>
+              <a:t>C’est précisément là que la valorisation des avis prend tout son sens.</a:t>
             </a:r>
             <a:endParaRPr dirty="0"/>
           </a:p>
@@ -1143,14 +1178,21 @@
             </a:pPr>
             <a:r>
               <a:rPr lang="fr-FR" dirty="0"/>
-              <a:t>Plusieurs parties prenantes sont concernées : les clients finaux, les équipes produit, les équipes data et les équipes qualité.</a:t>
+              <a:t>Plusieurs acteurs sont concernés :</a:t>
             </a:r>
             <a:br>
               <a:rPr lang="fr-FR" dirty="0"/>
             </a:br>
             <a:r>
               <a:rPr lang="fr-FR" dirty="0"/>
-              <a:t>La solution doit donc répondre à des besoins variés.</a:t>
+              <a:t>les clients finaux, les équipes produit, les équipes data et les équipes support.</a:t>
+            </a:r>
+            <a:br>
+              <a:rPr lang="fr-FR" dirty="0"/>
+            </a:br>
+            <a:r>
+              <a:rPr lang="fr-FR" dirty="0"/>
+              <a:t>Chacun a des attentes différentes vis-à-vis des avis clients.</a:t>
             </a:r>
             <a:endParaRPr dirty="0"/>
           </a:p>
@@ -1281,7 +1323,7 @@
             </a:pPr>
             <a:r>
               <a:rPr lang="fr-FR" dirty="0"/>
-              <a:t>Pour identifier le besoin, j’ai utilisé une approche centrée utilisateur, inspirée du Design </a:t>
+              <a:t>Pour identifier le besoin, J’ai adopté une démarche inspirée du Design </a:t>
             </a:r>
             <a:r>
               <a:rPr lang="fr-FR" dirty="0" err="1"/>
@@ -1289,7 +1331,7 @@
             </a:r>
             <a:r>
               <a:rPr lang="fr-FR" dirty="0"/>
-              <a:t>, afin de partir des usages réels plutôt que d’une solution technique préconçue.</a:t>
+              <a:t>, en partant des usages existants, des irritants métier, puis en formalisant les besoins prioritaires.</a:t>
             </a:r>
             <a:endParaRPr dirty="0"/>
           </a:p>
@@ -1428,7 +1470,14 @@
             </a:r>
             <a:r>
               <a:rPr lang="fr-FR" dirty="0"/>
-              <a:t> m’ont permis de formaliser des besoins concrets, aussi bien côté utilisateur final que côté équipes internes, notamment data et produit.</a:t>
+              <a:t> permettent de traduire les besoins métier concrets.</a:t>
+            </a:r>
+            <a:br>
+              <a:rPr lang="fr-FR" dirty="0"/>
+            </a:br>
+            <a:r>
+              <a:rPr lang="fr-FR" dirty="0"/>
+              <a:t>Par exemple, le responsable produit cherche à comprendre les retours clients, tandis que l’analyste data veut automatiser l’analyse. </a:t>
             </a:r>
             <a:endParaRPr dirty="0"/>
           </a:p>
@@ -1559,7 +1608,14 @@
             </a:pPr>
             <a:r>
               <a:rPr lang="fr-FR" dirty="0"/>
-              <a:t>Plusieurs cas d’usage ont été identifiés, allant de la mise en avant des avis pertinents à l’analyse des tendances de satisfaction produit.</a:t>
+              <a:t>Plusieurs cas d’usage ont été identifiés, mais le cas prioritaire retenu est la classification des avis selon leur pertinence.</a:t>
+            </a:r>
+            <a:br>
+              <a:rPr lang="fr-FR" dirty="0"/>
+            </a:br>
+            <a:r>
+              <a:rPr lang="fr-FR" dirty="0"/>
+              <a:t>Ce choix apporte un gain de temps immédiat et une réduction du travail manuel</a:t>
             </a:r>
             <a:endParaRPr dirty="0"/>
           </a:p>
@@ -1828,7 +1884,22 @@
             </a:pPr>
             <a:r>
               <a:rPr lang="fr-FR" dirty="0"/>
-              <a:t>Une veille technologique a été menée pour identifier les solutions les plus adaptées, en tenant compte des performances, des coûts et de la scalabilité.</a:t>
+              <a:t>Les choix technologiques ont été guidés par la scalabilité et la maturité des outils.</a:t>
+            </a:r>
+            <a:br>
+              <a:rPr lang="fr-FR" dirty="0"/>
+            </a:br>
+            <a:r>
+              <a:rPr lang="fr-FR" dirty="0"/>
+              <a:t>En parallèle, la veille réglementaire intègre le RGPD, le CCPA et l’AI </a:t>
+            </a:r>
+            <a:r>
+              <a:rPr lang="fr-FR" dirty="0" err="1"/>
+              <a:t>Act</a:t>
+            </a:r>
+            <a:r>
+              <a:rPr lang="fr-FR" dirty="0"/>
+              <a:t>, afin de garantir une solution conforme.</a:t>
             </a:r>
             <a:endParaRPr dirty="0"/>
           </a:p>
@@ -2221,14 +2292,21 @@
             </a:pPr>
             <a:r>
               <a:rPr lang="fr-FR" dirty="0"/>
-              <a:t>Amazon est un acteur majeur du e-commerce et du cloud.</a:t>
+              <a:t>La présentation est structurée en sept grandes parties, qui suivent volontairement le cycle de vie complet d’un projet data.</a:t>
             </a:r>
             <a:br>
               <a:rPr lang="fr-FR" dirty="0"/>
             </a:br>
             <a:r>
               <a:rPr lang="fr-FR" dirty="0"/>
-              <a:t>Dans ce contexte, les avis clients sont devenus un élément central de confiance, aussi bien pour les acheteurs que pour les équipes internes.</a:t>
+              <a:t>Je commencerai par le contexte et l’analyse stratégique, puis je détaillerai l’architecture et les pipelines Data Engineering.</a:t>
+            </a:r>
+            <a:br>
+              <a:rPr lang="fr-FR" dirty="0"/>
+            </a:br>
+            <a:r>
+              <a:rPr lang="fr-FR" dirty="0"/>
+              <a:t>Je présenterai ensuite l’analyse NLP des avis, avant de conclure sur la gouvernance, le pilotage et les perspectives. </a:t>
             </a:r>
             <a:endParaRPr dirty="0"/>
           </a:p>
@@ -2359,7 +2437,7 @@
             </a:pPr>
             <a:r>
               <a:rPr lang="fr-FR" dirty="0"/>
-              <a:t>À l’issue de cette phase, le besoin métier est clairement identifié, les choix sont justifiés et le périmètre du projet est défini.</a:t>
+              <a:t>À l’issue de cette phase, le besoin est clairement identifié, le cas d’usage priorisé, et les choix sont justifiés d’un point de vue technique et réglementaire.</a:t>
             </a:r>
             <a:endParaRPr dirty="0"/>
           </a:p>
@@ -2490,14 +2568,7 @@
             </a:pPr>
             <a:r>
               <a:rPr lang="fr-FR" dirty="0"/>
-              <a:t>Amazon est un acteur majeur du e-commerce et du cloud.</a:t>
-            </a:r>
-            <a:br>
-              <a:rPr lang="fr-FR" dirty="0"/>
-            </a:br>
-            <a:r>
-              <a:rPr lang="fr-FR" dirty="0"/>
-              <a:t>Dans ce contexte, les avis clients sont devenus un élément central de confiance, aussi bien pour les acheteurs que pour les équipes internes.</a:t>
+              <a:t>Une fois le besoin clairement identifié, la question devient : comment concevoir une architecture data capable d’y répondre de manière fiable et scalable ?</a:t>
             </a:r>
             <a:endParaRPr dirty="0"/>
           </a:p>
@@ -2761,6 +2832,28 @@
               <a:rPr lang="fr-FR" dirty="0"/>
               <a:t>J’ai conçu une architecture de type plateforme data, avec une séparation claire entre les sources, le stockage, les traitements et l’analyse.</a:t>
             </a:r>
+            <a:br>
+              <a:rPr lang="fr-FR" dirty="0"/>
+            </a:br>
+            <a:r>
+              <a:rPr lang="fr-FR" dirty="0"/>
+              <a:t>L’objectif est de découpler les usages analytiques des systèmes transactionnels, tout en garantissant la traçabilité.</a:t>
+            </a:r>
+          </a:p>
+          <a:p>
+            <a:pPr marL="0" lvl="0" indent="0" algn="l" rtl="0">
+              <a:spcBef>
+                <a:spcPts val="0"/>
+              </a:spcBef>
+              <a:spcAft>
+                <a:spcPts val="0"/>
+              </a:spcAft>
+              <a:buNone/>
+            </a:pPr>
+            <a:r>
+              <a:rPr lang="fr-FR" dirty="0"/>
+              <a:t>Cette architecture permet de passer d’un besoin métier à une plateforme data industrialisable, sans dépendance forte à un outil unique. </a:t>
+            </a:r>
             <a:endParaRPr dirty="0"/>
           </a:p>
         </p:txBody>
@@ -2890,7 +2983,21 @@
             </a:pPr>
             <a:r>
               <a:rPr lang="fr-FR" dirty="0"/>
-              <a:t>Les données proviennent principalement d’une base PostgreSQL transactionnelle, qui constitue la source de vérité du projet.</a:t>
+              <a:t>La source principale est une base PostgreSQL transactionnelle, qui joue le rôle de source de vérité.</a:t>
+            </a:r>
+            <a:br>
+              <a:rPr lang="fr-FR" dirty="0"/>
+            </a:br>
+            <a:r>
+              <a:rPr lang="fr-FR" dirty="0"/>
+              <a:t>On y retrouve les données produits, utilisateurs et avis clients.</a:t>
+            </a:r>
+            <a:br>
+              <a:rPr lang="fr-FR" dirty="0"/>
+            </a:br>
+            <a:r>
+              <a:rPr lang="fr-FR" dirty="0"/>
+              <a:t>Cette base n’est jamais interrogée directement à des fins analytiques. </a:t>
             </a:r>
             <a:endParaRPr dirty="0"/>
           </a:p>
@@ -3021,7 +3128,14 @@
             </a:pPr>
             <a:r>
               <a:rPr lang="fr-FR" dirty="0"/>
-              <a:t>Le Data Lake permet de stocker les données brutes, de conserver l’historique et de découpler les sources des usages analytiques.</a:t>
+              <a:t>Le Data Lake S3 permet de stocker les données brutes et intermédiaires.</a:t>
+            </a:r>
+            <a:br>
+              <a:rPr lang="fr-FR" dirty="0"/>
+            </a:br>
+            <a:r>
+              <a:rPr lang="fr-FR" dirty="0"/>
+              <a:t>Il joue un rôle central dans la conservation de l’historique et la gestion des transformations successives. </a:t>
             </a:r>
             <a:endParaRPr dirty="0"/>
           </a:p>
@@ -3154,6 +3268,50 @@
               <a:rPr lang="fr-FR" dirty="0"/>
               <a:t>Cette organisation en trois niveaux permet de sécuriser les transformations tout en garantissant la traçabilité des données.</a:t>
             </a:r>
+          </a:p>
+          <a:p>
+            <a:pPr marL="0" lvl="0" indent="0" algn="l" rtl="0">
+              <a:spcBef>
+                <a:spcPts val="0"/>
+              </a:spcBef>
+              <a:spcAft>
+                <a:spcPts val="0"/>
+              </a:spcAft>
+              <a:buNone/>
+            </a:pPr>
+            <a:r>
+              <a:rPr lang="fr-FR" dirty="0"/>
+              <a:t>La couche Bronze contient les données brutes, sans transformation.</a:t>
+            </a:r>
+            <a:br>
+              <a:rPr lang="fr-FR" dirty="0"/>
+            </a:br>
+            <a:r>
+              <a:rPr lang="fr-FR" dirty="0"/>
+              <a:t>La Silver applique des nettoyages et contrôles de qualité.</a:t>
+            </a:r>
+            <a:br>
+              <a:rPr lang="fr-FR" dirty="0"/>
+            </a:br>
+            <a:r>
+              <a:rPr lang="fr-FR" dirty="0"/>
+              <a:t>La Gold correspond aux données prêtes pour l’analyse métier.</a:t>
+            </a:r>
+            <a:br>
+              <a:rPr lang="fr-FR" dirty="0"/>
+            </a:br>
+            <a:r>
+              <a:rPr lang="fr-FR" dirty="0"/>
+              <a:t>Cette structuration garantit traçabilité, </a:t>
+            </a:r>
+            <a:r>
+              <a:rPr lang="fr-FR" dirty="0" err="1"/>
+              <a:t>auditabilité</a:t>
+            </a:r>
+            <a:r>
+              <a:rPr lang="fr-FR" dirty="0"/>
+              <a:t> et robustesse. »</a:t>
+            </a:r>
             <a:endParaRPr dirty="0"/>
           </a:p>
         </p:txBody>
@@ -3287,7 +3445,21 @@
             </a:r>
             <a:r>
               <a:rPr lang="fr-FR" dirty="0"/>
-              <a:t> joue le rôle de Data Warehouse analytique, optimisé pour les requêtes et la restitution métier.</a:t>
+              <a:t> est utilisé comme Data Warehouse analytique.</a:t>
+            </a:r>
+            <a:br>
+              <a:rPr lang="fr-FR" dirty="0"/>
+            </a:br>
+            <a:r>
+              <a:rPr lang="fr-FR" dirty="0"/>
+              <a:t>Il permet une séparation stockage / calcul et une forte performance sur les requêtes analytiques.</a:t>
+            </a:r>
+            <a:br>
+              <a:rPr lang="fr-FR" dirty="0"/>
+            </a:br>
+            <a:r>
+              <a:rPr lang="fr-FR" dirty="0"/>
+              <a:t>C’est la couche exposée aux usages métier et analytiques.</a:t>
             </a:r>
             <a:endParaRPr dirty="0"/>
           </a:p>
@@ -3418,7 +3590,15 @@
             </a:pPr>
             <a:r>
               <a:rPr lang="fr-FR" dirty="0"/>
-              <a:t>Les données rejetées sont conservées afin de faciliter l’audit, la correction et l’amélioration continue des pipelines.</a:t>
+              <a:t>Les données rejetées sont conservées dans </a:t>
+            </a:r>
+            <a:r>
+              <a:rPr lang="fr-FR" dirty="0" err="1"/>
+              <a:t>mangoDB</a:t>
+            </a:r>
+            <a:r>
+              <a:rPr lang="fr-FR" dirty="0"/>
+              <a:t> afin de faciliter l’audit, la correction et l’amélioration continue des pipelines.</a:t>
             </a:r>
             <a:endParaRPr dirty="0"/>
           </a:p>
@@ -3559,7 +3739,15 @@
             </a:pPr>
             <a:r>
               <a:rPr lang="fr-FR" dirty="0"/>
-              <a:t>L’orchestration permet d’automatiser les traitements, de gérer les dépendances et de fiabiliser l’exécution des pipelines.</a:t>
+              <a:t>L’orchestration ici </a:t>
+            </a:r>
+            <a:r>
+              <a:rPr lang="fr-FR" dirty="0" err="1"/>
+              <a:t>Airflow</a:t>
+            </a:r>
+            <a:r>
+              <a:rPr lang="fr-FR" dirty="0"/>
+              <a:t> permet d’automatiser les traitements, de gérer les dépendances et de fiabiliser l’exécution des pipelines.</a:t>
             </a:r>
           </a:p>
           <a:p>
@@ -3701,6 +3889,21 @@
             </a:pPr>
             <a:r>
               <a:rPr lang="fr-FR" dirty="0"/>
+              <a:t>Je commence par poser le contexte général du projet, la problématique métier et les objectifs globaux.</a:t>
+            </a:r>
+          </a:p>
+          <a:p>
+            <a:pPr marL="0" lvl="0" indent="0" algn="l" rtl="0">
+              <a:spcBef>
+                <a:spcPts val="0"/>
+              </a:spcBef>
+              <a:spcAft>
+                <a:spcPts val="0"/>
+              </a:spcAft>
+              <a:buNone/>
+            </a:pPr>
+            <a:r>
+              <a:rPr lang="fr-FR" dirty="0"/>
               <a:t>Amazon est un acteur majeur du e-commerce et du cloud.</a:t>
             </a:r>
             <a:br>
@@ -3839,7 +4042,21 @@
             </a:pPr>
             <a:r>
               <a:rPr lang="fr-FR" dirty="0"/>
-              <a:t>La sécurité et la traçabilité sont intégrées à chaque étape pour garantir la conformité et la confiance dans les données.</a:t>
+              <a:t>La sécurité est intégrée dès la conception :</a:t>
+            </a:r>
+            <a:br>
+              <a:rPr lang="fr-FR" dirty="0"/>
+            </a:br>
+            <a:r>
+              <a:rPr lang="fr-FR" dirty="0"/>
+              <a:t>gestion des rôles, cloisonnement des environnements et traçabilité des accès.</a:t>
+            </a:r>
+            <a:br>
+              <a:rPr lang="fr-FR" dirty="0"/>
+            </a:br>
+            <a:r>
+              <a:rPr lang="fr-FR" dirty="0"/>
+              <a:t>Cela répond directement aux exigences réglementaires.</a:t>
             </a:r>
             <a:endParaRPr dirty="0"/>
           </a:p>
@@ -3968,6 +4185,10 @@
               </a:spcAft>
               <a:buNone/>
             </a:pPr>
+            <a:r>
+              <a:rPr lang="fr-FR" dirty="0"/>
+              <a:t>Cette architecture permet de passer d’un besoin métier à une plateforme data industrialisable, sans dépendance forte à un outil unique. </a:t>
+            </a:r>
             <a:endParaRPr dirty="0"/>
           </a:p>
         </p:txBody>
@@ -4097,14 +4318,7 @@
             </a:pPr>
             <a:r>
               <a:rPr lang="fr-FR" dirty="0"/>
-              <a:t>Amazon est un acteur majeur du e-commerce et du cloud.</a:t>
-            </a:r>
-            <a:br>
-              <a:rPr lang="fr-FR" dirty="0"/>
-            </a:br>
-            <a:r>
-              <a:rPr lang="fr-FR" dirty="0"/>
-              <a:t>Dans ce contexte, les avis clients sont devenus un élément central de confiance, aussi bien pour les acheteurs que pour les équipes internes.</a:t>
+              <a:t>Une architecture n’a de valeur que si elle est alimentée par des pipelines fiables et automatisés</a:t>
             </a:r>
             <a:endParaRPr dirty="0"/>
           </a:p>
@@ -4498,6 +4712,36 @@
               <a:rPr lang="fr-FR" dirty="0"/>
               <a:t>L’ingestion est automatisée afin d’assurer des chargements réguliers, reproductibles et traçables.</a:t>
             </a:r>
+          </a:p>
+          <a:p>
+            <a:pPr marL="0" lvl="0" indent="0" algn="l" rtl="0">
+              <a:spcBef>
+                <a:spcPts val="0"/>
+              </a:spcBef>
+              <a:spcAft>
+                <a:spcPts val="0"/>
+              </a:spcAft>
+              <a:buNone/>
+            </a:pPr>
+            <a:r>
+              <a:rPr lang="fr-FR" dirty="0"/>
+              <a:t>L’ingestion se fait via des scripts Python utilisant </a:t>
+            </a:r>
+            <a:r>
+              <a:rPr lang="fr-FR" dirty="0" err="1"/>
+              <a:t>SQLAlchemy</a:t>
+            </a:r>
+            <a:r>
+              <a:rPr lang="fr-FR" dirty="0"/>
+              <a:t>.</a:t>
+            </a:r>
+            <a:br>
+              <a:rPr lang="fr-FR" dirty="0"/>
+            </a:br>
+            <a:r>
+              <a:rPr lang="fr-FR" dirty="0"/>
+              <a:t>Chaque extraction est horodatée et contrôlée afin de garantir l’intégrité des données. </a:t>
+            </a:r>
             <a:endParaRPr dirty="0"/>
           </a:p>
         </p:txBody>
@@ -4627,7 +4871,21 @@
             </a:pPr>
             <a:r>
               <a:rPr lang="fr-FR" dirty="0"/>
-              <a:t>Des contrôles qualité sont appliqués à chaque étape pour garantir la cohérence et la fiabilité des données.</a:t>
+              <a:t>Des règles de qualité sont appliquées :</a:t>
+            </a:r>
+            <a:br>
+              <a:rPr lang="fr-FR" dirty="0"/>
+            </a:br>
+            <a:r>
+              <a:rPr lang="fr-FR" dirty="0"/>
+              <a:t>valeurs manquantes, formats, doublons.</a:t>
+            </a:r>
+            <a:br>
+              <a:rPr lang="fr-FR" dirty="0"/>
+            </a:br>
+            <a:r>
+              <a:rPr lang="fr-FR" dirty="0"/>
+              <a:t>Ces contrôles sont essentiels avant toute analyse.</a:t>
             </a:r>
             <a:endParaRPr dirty="0"/>
           </a:p>
@@ -4760,6 +5018,28 @@
               <a:rPr lang="fr-FR" dirty="0"/>
               <a:t>Les transformations visent à enrichir les données et à les structurer pour répondre aux besoins analytiques.</a:t>
             </a:r>
+          </a:p>
+          <a:p>
+            <a:pPr marL="0" lvl="0" indent="0" algn="l" rtl="0">
+              <a:spcBef>
+                <a:spcPts val="0"/>
+              </a:spcBef>
+              <a:spcAft>
+                <a:spcPts val="0"/>
+              </a:spcAft>
+              <a:buNone/>
+            </a:pPr>
+            <a:r>
+              <a:rPr lang="fr-FR" dirty="0"/>
+              <a:t>Elles enrichissent les données :</a:t>
+            </a:r>
+            <a:br>
+              <a:rPr lang="fr-FR" dirty="0"/>
+            </a:br>
+            <a:r>
+              <a:rPr lang="fr-FR" dirty="0"/>
+              <a:t>calculs d’indicateurs, normalisation, préparation pour l’analyse NLP</a:t>
+            </a:r>
             <a:endParaRPr dirty="0"/>
           </a:p>
         </p:txBody>
@@ -4891,6 +5171,28 @@
               <a:rPr lang="fr-FR" dirty="0"/>
               <a:t>Les erreurs sont gérées de manière explicite afin de ne jamais perdre de données et d’améliorer les pipelines.</a:t>
             </a:r>
+          </a:p>
+          <a:p>
+            <a:pPr marL="0" lvl="0" indent="0" algn="l" rtl="0">
+              <a:spcBef>
+                <a:spcPts val="0"/>
+              </a:spcBef>
+              <a:spcAft>
+                <a:spcPts val="0"/>
+              </a:spcAft>
+              <a:buNone/>
+            </a:pPr>
+            <a:r>
+              <a:rPr lang="fr-FR" dirty="0"/>
+              <a:t>Les données rejetées ne sont jamais supprimées.</a:t>
+            </a:r>
+            <a:br>
+              <a:rPr lang="fr-FR" dirty="0"/>
+            </a:br>
+            <a:r>
+              <a:rPr lang="fr-FR" dirty="0"/>
+              <a:t>Elles sont stockées à part pour audit, correction et amélioration continue.</a:t>
+            </a:r>
             <a:endParaRPr dirty="0"/>
           </a:p>
         </p:txBody>
@@ -5024,7 +5326,14 @@
             </a:r>
             <a:r>
               <a:rPr lang="fr-FR" dirty="0"/>
-              <a:t> permet de visualiser les pipelines, de gérer les dépendances et de sécuriser leur exécution dans le temps.</a:t>
+              <a:t> permet d’orchestrer les pipelines, de gérer les dépendances et de fiabiliser l’exécution.</a:t>
+            </a:r>
+            <a:br>
+              <a:rPr lang="fr-FR" dirty="0"/>
+            </a:br>
+            <a:r>
+              <a:rPr lang="fr-FR" dirty="0"/>
+              <a:t>Même si l’orchestration est préparée, la logique est déjà industrialisable.</a:t>
             </a:r>
             <a:endParaRPr dirty="0"/>
           </a:p>
@@ -5137,14 +5446,29 @@
             </a:pPr>
             <a:r>
               <a:rPr lang="fr-FR" dirty="0"/>
-              <a:t>Amazon est un acteur majeur du e-commerce et du cloud.</a:t>
+              <a:t>Amazon est un acteur majeur du e-commerce et du cloud </a:t>
+            </a:r>
+            <a:r>
+              <a:rPr lang="fr-FR" dirty="0" err="1"/>
+              <a:t>computing</a:t>
+            </a:r>
+            <a:r>
+              <a:rPr lang="fr-FR" dirty="0"/>
+              <a:t>.</a:t>
             </a:r>
             <a:br>
               <a:rPr lang="fr-FR" dirty="0"/>
             </a:br>
             <a:r>
               <a:rPr lang="fr-FR" dirty="0"/>
-              <a:t>Dans ce contexte, les avis clients sont devenus un élément central de confiance, aussi bien pour les acheteurs que pour les équipes internes.</a:t>
+              <a:t>Dans ce contexte, les avis clients jouent un rôle clé : ils influencent la confiance des acheteurs, la visibilité des produits et même certaines décisions internes.</a:t>
+            </a:r>
+            <a:br>
+              <a:rPr lang="fr-FR" dirty="0"/>
+            </a:br>
+            <a:r>
+              <a:rPr lang="fr-FR" dirty="0"/>
+              <a:t>On est donc face à une donnée stratégique, mais difficile à exploiter à grande échelle.</a:t>
             </a:r>
             <a:endParaRPr dirty="0"/>
           </a:p>
@@ -5409,7 +5733,14 @@
             </a:pPr>
             <a:r>
               <a:rPr lang="fr-FR" dirty="0"/>
-              <a:t>Des tests sont réalisés pour s’assurer que les données produites correspondent aux attentes fonctionnelles.</a:t>
+              <a:t>Des tests fonctionnels valident que les données produites correspondent aux attentes métier.</a:t>
+            </a:r>
+            <a:br>
+              <a:rPr lang="fr-FR" dirty="0"/>
+            </a:br>
+            <a:r>
+              <a:rPr lang="fr-FR" dirty="0"/>
+              <a:t>C’est une étape clé avant toute mise en production. </a:t>
             </a:r>
             <a:endParaRPr dirty="0"/>
           </a:p>
@@ -5542,6 +5873,21 @@
               <a:rPr lang="fr-FR" dirty="0"/>
               <a:t>L’objectif était de concevoir une solution réutilisable et industrialisable, et non un pipeline ponctuel.</a:t>
             </a:r>
+          </a:p>
+          <a:p>
+            <a:pPr marL="0" lvl="0" indent="0" algn="l" rtl="0">
+              <a:spcBef>
+                <a:spcPts val="0"/>
+              </a:spcBef>
+              <a:spcAft>
+                <a:spcPts val="0"/>
+              </a:spcAft>
+              <a:buNone/>
+            </a:pPr>
+            <a:r>
+              <a:rPr lang="fr-FR" dirty="0"/>
+              <a:t>pas un script ponctuel, mais une chaîne data maintenable dans le temps.</a:t>
+            </a:r>
             <a:endParaRPr dirty="0"/>
           </a:p>
         </p:txBody>
@@ -5802,14 +6148,7 @@
             </a:pPr>
             <a:r>
               <a:rPr lang="fr-FR" dirty="0"/>
-              <a:t>Amazon est un acteur majeur du e-commerce et du cloud.</a:t>
-            </a:r>
-            <a:br>
-              <a:rPr lang="fr-FR" dirty="0"/>
-            </a:br>
-            <a:r>
-              <a:rPr lang="fr-FR" dirty="0"/>
-              <a:t>Dans ce contexte, les avis clients sont devenus un élément central de confiance, aussi bien pour les acheteurs que pour les équipes internes.</a:t>
+              <a:t>Une fois les données fiabilisées, l’enjeu est de créer de la valeur métier.</a:t>
             </a:r>
             <a:endParaRPr dirty="0"/>
           </a:p>
@@ -5942,6 +6281,28 @@
               <a:rPr lang="fr-FR" dirty="0"/>
               <a:t>Les avis textuels contiennent des informations riches qui ne sont pas visibles uniquement à travers les notes.</a:t>
             </a:r>
+          </a:p>
+          <a:p>
+            <a:pPr marL="0" lvl="0" indent="0" algn="l" rtl="0">
+              <a:spcBef>
+                <a:spcPts val="0"/>
+              </a:spcBef>
+              <a:spcAft>
+                <a:spcPts val="0"/>
+              </a:spcAft>
+              <a:buNone/>
+            </a:pPr>
+            <a:r>
+              <a:rPr lang="fr-FR" dirty="0"/>
+              <a:t>Les notes chiffrées ne suffisent pas.</a:t>
+            </a:r>
+            <a:br>
+              <a:rPr lang="fr-FR" dirty="0"/>
+            </a:br>
+            <a:r>
+              <a:rPr lang="fr-FR" dirty="0"/>
+              <a:t>Le texte contient des signaux faibles très précieux.</a:t>
+            </a:r>
             <a:endParaRPr dirty="0"/>
           </a:p>
         </p:txBody>
@@ -6202,7 +6563,7 @@
             </a:pPr>
             <a:r>
               <a:rPr lang="fr-FR" dirty="0"/>
-              <a:t>Les textes sont nettoyés et préparés afin d’obtenir des résultats NLP cohérents et exploitables.</a:t>
+              <a:t>Les avis sont nettoyés, normalisés et enrichis par des métriques simples comme la longueur ou la présence d’images. </a:t>
             </a:r>
             <a:endParaRPr dirty="0"/>
           </a:p>
@@ -6341,7 +6702,14 @@
             </a:r>
             <a:r>
               <a:rPr lang="fr-FR" dirty="0"/>
-              <a:t> permet de combiner plusieurs critères afin de produire un indicateur de pertinence unique.</a:t>
+              <a:t> combine plusieurs critères pondérés pour produire un indicateur unique de pertinence.</a:t>
+            </a:r>
+            <a:br>
+              <a:rPr lang="fr-FR" dirty="0"/>
+            </a:br>
+            <a:r>
+              <a:rPr lang="fr-FR" dirty="0"/>
+              <a:t>Il est volontairement explicable.</a:t>
             </a:r>
             <a:endParaRPr dirty="0"/>
           </a:p>
@@ -6603,14 +6971,21 @@
             </a:pPr>
             <a:r>
               <a:rPr lang="fr-FR" dirty="0"/>
-              <a:t>Le problème n’est pas le manque d’avis, mais leur volume et leur hétérogénéité.</a:t>
+              <a:t>Le volume d’avis est massif, mais très hétérogène.</a:t>
             </a:r>
             <a:br>
               <a:rPr lang="fr-FR" dirty="0"/>
             </a:br>
             <a:r>
               <a:rPr lang="fr-FR" dirty="0"/>
-              <a:t>Il devient difficile d’identifier rapidement les avis réellement utiles parmi des centaines, voire des milliers de commentaires par produit.</a:t>
+              <a:t>Tous les avis n’ont pas la même valeur : certains sont très courts, peu exploitables, voire bruités.</a:t>
+            </a:r>
+            <a:br>
+              <a:rPr lang="fr-FR" dirty="0"/>
+            </a:br>
+            <a:r>
+              <a:rPr lang="fr-FR" dirty="0"/>
+              <a:t>La difficulté principale est donc d’identifier rapidement les avis réellement pertinents dans une masse de données textuelles. </a:t>
             </a:r>
             <a:endParaRPr dirty="0"/>
           </a:p>
@@ -7013,6 +7388,21 @@
               <a:rPr lang="fr-FR" dirty="0"/>
               <a:t>Les résultats montrent une hiérarchisation claire des avis et une meilleure lisibilité pour les équipes.</a:t>
             </a:r>
+          </a:p>
+          <a:p>
+            <a:pPr marL="0" lvl="0" indent="0" algn="l" rtl="0">
+              <a:spcBef>
+                <a:spcPts val="0"/>
+              </a:spcBef>
+              <a:spcAft>
+                <a:spcPts val="0"/>
+              </a:spcAft>
+              <a:buNone/>
+            </a:pPr>
+            <a:r>
+              <a:rPr lang="fr-FR" dirty="0"/>
+              <a:t>Ils sont restitués sous forme de tables analytiques exploitables directement.</a:t>
+            </a:r>
             <a:endParaRPr dirty="0"/>
           </a:p>
         </p:txBody>
@@ -7556,14 +7946,7 @@
             </a:pPr>
             <a:r>
               <a:rPr lang="fr-FR" dirty="0"/>
-              <a:t>Amazon est un acteur majeur du e-commerce et du cloud.</a:t>
-            </a:r>
-            <a:br>
-              <a:rPr lang="fr-FR" dirty="0"/>
-            </a:br>
-            <a:r>
-              <a:rPr lang="fr-FR" dirty="0"/>
-              <a:t>Dans ce contexte, les avis clients sont devenus un élément central de confiance, aussi bien pour les acheteurs que pour les équipes internes.</a:t>
+              <a:t>Une solution data n’a de valeur que si elle est gouvernée et durable.</a:t>
             </a:r>
             <a:endParaRPr dirty="0"/>
           </a:p>
@@ -7825,7 +8208,15 @@
             </a:pPr>
             <a:r>
               <a:rPr lang="fr-FR" dirty="0"/>
-              <a:t>Les réglementations ont été intégrées dès la conception, selon une approche </a:t>
+              <a:t>Le RGPD, le CCPA et l’AI </a:t>
+            </a:r>
+            <a:r>
+              <a:rPr lang="fr-FR" dirty="0" err="1"/>
+              <a:t>Act</a:t>
+            </a:r>
+            <a:r>
+              <a:rPr lang="fr-FR" dirty="0"/>
+              <a:t> sont pris en compte dès la conception, selon une approche </a:t>
             </a:r>
             <a:r>
               <a:rPr lang="fr-FR" dirty="0" err="1"/>
@@ -7966,6 +8357,25 @@
               <a:rPr lang="fr-FR" dirty="0"/>
               <a:t>Les accès aux données sont contrôlés afin de garantir la sécurité et la confidentialité.</a:t>
             </a:r>
+          </a:p>
+          <a:p>
+            <a:pPr marL="0" lvl="0" indent="0" algn="l" rtl="0">
+              <a:spcBef>
+                <a:spcPts val="0"/>
+              </a:spcBef>
+              <a:spcAft>
+                <a:spcPts val="0"/>
+              </a:spcAft>
+              <a:buNone/>
+            </a:pPr>
+            <a:r>
+              <a:rPr lang="fr-FR" dirty="0" err="1"/>
+              <a:t>Ilssont</a:t>
+            </a:r>
+            <a:r>
+              <a:rPr lang="fr-FR" dirty="0"/>
+              <a:t> contrôlés par rôles et les données sensibles sont protégées.</a:t>
+            </a:r>
             <a:endParaRPr dirty="0"/>
           </a:p>
         </p:txBody>
@@ -8095,7 +8505,21 @@
             </a:pPr>
             <a:r>
               <a:rPr lang="fr-FR" dirty="0"/>
-              <a:t>L’objectif du projet est donc d’automatiser l’analyse des avis clients, afin d’identifier les plus pertinents et d’aider les équipes métier à prendre de meilleures décisions.</a:t>
+              <a:t>L’objectif est triple :</a:t>
+            </a:r>
+            <a:br>
+              <a:rPr lang="fr-FR" dirty="0"/>
+            </a:br>
+            <a:r>
+              <a:rPr lang="fr-FR" dirty="0"/>
+              <a:t>identifier et classer les avis les plus pertinents, automatiser l’analyse des avis textuels, et améliorer la qualité des décisions métier.</a:t>
+            </a:r>
+            <a:br>
+              <a:rPr lang="fr-FR" dirty="0"/>
+            </a:br>
+            <a:r>
+              <a:rPr lang="fr-FR" dirty="0"/>
+              <a:t>Cela implique de mettre en place une solution fiable, automatisée et gouvernée. </a:t>
             </a:r>
             <a:endParaRPr dirty="0"/>
           </a:p>
@@ -8752,6 +9176,21 @@
               <a:rPr lang="fr-FR" dirty="0"/>
               <a:t>Le projet a été piloté comme un projet réel, avec des livrables, des délais et des arbitrages.</a:t>
             </a:r>
+          </a:p>
+          <a:p>
+            <a:pPr marL="0" lvl="0" indent="0" algn="l" rtl="0">
+              <a:spcBef>
+                <a:spcPts val="0"/>
+              </a:spcBef>
+              <a:spcAft>
+                <a:spcPts val="0"/>
+              </a:spcAft>
+              <a:buNone/>
+            </a:pPr>
+            <a:r>
+              <a:rPr lang="fr-FR" dirty="0"/>
+              <a:t>Il a été piloté avec une logique coûts / valeur</a:t>
+            </a:r>
             <a:endParaRPr dirty="0"/>
           </a:p>
         </p:txBody>
@@ -9143,14 +9582,7 @@
             </a:pPr>
             <a:r>
               <a:rPr lang="fr-FR" dirty="0"/>
-              <a:t>Amazon est un acteur majeur du e-commerce et du cloud.</a:t>
-            </a:r>
-            <a:br>
-              <a:rPr lang="fr-FR" dirty="0"/>
-            </a:br>
-            <a:r>
-              <a:rPr lang="fr-FR" dirty="0"/>
-              <a:t>Dans ce contexte, les avis clients sont devenus un élément central de confiance, aussi bien pour les acheteurs que pour les équipes internes.</a:t>
+              <a:t>Je vais maintenant conclure cette présentation. </a:t>
             </a:r>
             <a:endParaRPr dirty="0"/>
           </a:p>
@@ -9414,6 +9846,36 @@
               <a:rPr lang="fr-FR" dirty="0"/>
               <a:t>Plusieurs évolutions sont possibles, notamment sur les modèles et les cas d’usage.</a:t>
             </a:r>
+          </a:p>
+          <a:p>
+            <a:pPr marL="0" lvl="0" indent="0" algn="l" rtl="0">
+              <a:spcBef>
+                <a:spcPts val="0"/>
+              </a:spcBef>
+              <a:spcAft>
+                <a:spcPts val="0"/>
+              </a:spcAft>
+              <a:buNone/>
+            </a:pPr>
+            <a:r>
+              <a:rPr lang="fr-FR" dirty="0"/>
+              <a:t>Les limites identifiées ouvrent la voie à des améliorations futures. </a:t>
+            </a:r>
+          </a:p>
+          <a:p>
+            <a:pPr marL="0" lvl="0" indent="0" algn="l" rtl="0">
+              <a:spcBef>
+                <a:spcPts val="0"/>
+              </a:spcBef>
+              <a:spcAft>
+                <a:spcPts val="0"/>
+              </a:spcAft>
+              <a:buNone/>
+            </a:pPr>
+            <a:r>
+              <a:rPr lang="fr-FR" dirty="0"/>
+              <a:t>Les perspectives incluent une industrialisation complète et des modèles NLP plus avancés. </a:t>
+            </a:r>
             <a:endParaRPr dirty="0"/>
           </a:p>
         </p:txBody>
@@ -9543,59 +10005,21 @@
             </a:pPr>
             <a:r>
               <a:rPr lang="fr-FR" dirty="0"/>
-              <a:t>Le projet s’articule autour de quatre grandes phases :</a:t>
+              <a:t>Le projet s’articule autour de quatre piliers :</a:t>
             </a:r>
             <a:br>
               <a:rPr lang="fr-FR" dirty="0"/>
             </a:br>
             <a:r>
               <a:rPr lang="fr-FR" dirty="0"/>
-              <a:t>d’abord le cadrage et l’analyse stratégique, </a:t>
-            </a:r>
-          </a:p>
-          <a:p>
-            <a:pPr marL="0" lvl="0" indent="0" algn="l" rtl="0">
-              <a:spcBef>
-                <a:spcPts val="0"/>
-              </a:spcBef>
-              <a:spcAft>
-                <a:spcPts val="0"/>
-              </a:spcAft>
-              <a:buNone/>
-            </a:pPr>
-            <a:r>
-              <a:rPr lang="fr-FR" dirty="0"/>
-              <a:t>puis le data engineering, </a:t>
-            </a:r>
-          </a:p>
-          <a:p>
-            <a:pPr marL="0" lvl="0" indent="0" algn="l" rtl="0">
-              <a:spcBef>
-                <a:spcPts val="0"/>
-              </a:spcBef>
-              <a:spcAft>
-                <a:spcPts val="0"/>
-              </a:spcAft>
-              <a:buNone/>
-            </a:pPr>
-            <a:r>
-              <a:rPr lang="fr-FR" dirty="0"/>
-              <a:t>ensuite l’analyse avancée, </a:t>
-            </a:r>
-          </a:p>
-          <a:p>
-            <a:pPr marL="0" lvl="0" indent="0" algn="l" rtl="0">
-              <a:spcBef>
-                <a:spcPts val="0"/>
-              </a:spcBef>
-              <a:spcAft>
-                <a:spcPts val="0"/>
-              </a:spcAft>
-              <a:buNone/>
-            </a:pPr>
-            <a:r>
-              <a:rPr lang="fr-FR" dirty="0"/>
-              <a:t>et enfin la gouvernance et le pilotage.</a:t>
+              <a:t>l’analyse stratégique, le Data Engineering, l’analyse avancée via le NLP, et enfin la gouvernance et le pilotage.</a:t>
+            </a:r>
+            <a:br>
+              <a:rPr lang="fr-FR" dirty="0"/>
+            </a:br>
+            <a:r>
+              <a:rPr lang="fr-FR" dirty="0"/>
+              <a:t>L’idée est de couvrir toute la chaîne de valeur, pas uniquement l’aspect technique.</a:t>
             </a:r>
             <a:endParaRPr dirty="0"/>
           </a:p>
@@ -9976,7 +10400,11 @@
               </a:spcAft>
               <a:buNone/>
             </a:pPr>
-            <a:endParaRPr/>
+            <a:r>
+              <a:rPr lang="fr-FR" dirty="0"/>
+              <a:t>Je vous remercie pour votre attention et je suis prêt à répondre à vos questions. </a:t>
+            </a:r>
+            <a:endParaRPr dirty="0"/>
           </a:p>
         </p:txBody>
       </p:sp>
@@ -10100,7 +10528,14 @@
             </a:pPr>
             <a:r>
               <a:rPr lang="fr-FR" dirty="0"/>
-              <a:t>Ce projet est avant tout orienté Data Engineering, avec une forte dimension analytique et une attention particulière portée à la gouvernance et aux contraintes réglementaires.</a:t>
+              <a:t>Ce projet est clairement orienté Data Engineering, avec une forte dimension de valorisation métier.</a:t>
+            </a:r>
+            <a:br>
+              <a:rPr lang="fr-FR" dirty="0"/>
+            </a:br>
+            <a:r>
+              <a:rPr lang="fr-FR" dirty="0"/>
+              <a:t>Il prend en compte les contraintes techniques, mais aussi réglementaires et organisationnelles, comme dans un contexte d’entreprise réel.</a:t>
             </a:r>
             <a:endParaRPr dirty="0"/>
           </a:p>
@@ -10231,14 +10666,7 @@
             </a:pPr>
             <a:r>
               <a:rPr lang="fr-FR" dirty="0"/>
-              <a:t>Amazon est un acteur majeur du e-commerce et du cloud.</a:t>
-            </a:r>
-            <a:br>
-              <a:rPr lang="fr-FR" dirty="0"/>
-            </a:br>
-            <a:r>
-              <a:rPr lang="fr-FR" dirty="0"/>
-              <a:t>Dans ce contexte, les avis clients sont devenus un élément central de confiance, aussi bien pour les acheteurs que pour les équipes internes.</a:t>
+              <a:t>« Une fois le contexte posé, nous entrons dans la phase d’analyse stratégique et d’identification du besoin. »</a:t>
             </a:r>
             <a:endParaRPr dirty="0"/>
           </a:p>
@@ -11052,7 +11480,7 @@
             </a:lvl9pPr>
           </a:lstStyle>
           <a:p>
-            <a:endParaRPr/>
+            <a:endParaRPr dirty="0"/>
           </a:p>
         </p:txBody>
       </p:sp>
@@ -11181,7 +11609,7 @@
             </a:lvl9pPr>
           </a:lstStyle>
           <a:p>
-            <a:endParaRPr/>
+            <a:endParaRPr dirty="0"/>
           </a:p>
         </p:txBody>
       </p:sp>
@@ -13445,35 +13873,35 @@
           <a:p>
             <a:pPr lvl="0"/>
             <a:r>
-              <a:rPr lang="fr-FR"/>
+              <a:rPr lang="fr-FR" dirty="0"/>
               <a:t>Cliquez pour modifier les styles du texte du masque</a:t>
             </a:r>
           </a:p>
           <a:p>
             <a:pPr lvl="1"/>
             <a:r>
-              <a:rPr lang="fr-FR"/>
+              <a:rPr lang="fr-FR" dirty="0"/>
               <a:t>Deuxième niveau</a:t>
             </a:r>
           </a:p>
           <a:p>
             <a:pPr lvl="2"/>
             <a:r>
-              <a:rPr lang="fr-FR"/>
+              <a:rPr lang="fr-FR" dirty="0"/>
               <a:t>Troisième niveau</a:t>
             </a:r>
           </a:p>
           <a:p>
             <a:pPr lvl="3"/>
             <a:r>
-              <a:rPr lang="fr-FR"/>
+              <a:rPr lang="fr-FR" dirty="0"/>
               <a:t>Quatrième niveau</a:t>
             </a:r>
           </a:p>
           <a:p>
             <a:pPr lvl="4"/>
             <a:r>
-              <a:rPr lang="fr-FR"/>
+              <a:rPr lang="fr-FR" dirty="0"/>
               <a:t>Cinquième niveau</a:t>
             </a:r>
           </a:p>
@@ -13773,7 +14201,7 @@
         <a:buNone/>
         <a:defRPr sz="3300" kern="1200">
           <a:solidFill>
-            <a:schemeClr val="tx1"/>
+            <a:srgbClr val="002060"/>
           </a:solidFill>
           <a:latin typeface="+mj-lt"/>
           <a:ea typeface="+mj-ea"/>
@@ -13793,7 +14221,10 @@
         <a:buChar char="•"/>
         <a:defRPr sz="2100" kern="1200">
           <a:solidFill>
-            <a:schemeClr val="tx1"/>
+            <a:schemeClr val="tx2">
+              <a:lumMod val="75000"/>
+              <a:lumOff val="25000"/>
+            </a:schemeClr>
           </a:solidFill>
           <a:latin typeface="+mn-lt"/>
           <a:ea typeface="+mn-ea"/>
@@ -13811,7 +14242,10 @@
         <a:buChar char="•"/>
         <a:defRPr sz="1800" kern="1200">
           <a:solidFill>
-            <a:schemeClr val="tx1"/>
+            <a:schemeClr val="tx2">
+              <a:lumMod val="75000"/>
+              <a:lumOff val="25000"/>
+            </a:schemeClr>
           </a:solidFill>
           <a:latin typeface="+mn-lt"/>
           <a:ea typeface="+mn-ea"/>
@@ -13829,7 +14263,10 @@
         <a:buChar char="•"/>
         <a:defRPr sz="1500" kern="1200">
           <a:solidFill>
-            <a:schemeClr val="tx1"/>
+            <a:schemeClr val="tx2">
+              <a:lumMod val="75000"/>
+              <a:lumOff val="25000"/>
+            </a:schemeClr>
           </a:solidFill>
           <a:latin typeface="+mn-lt"/>
           <a:ea typeface="+mn-ea"/>
@@ -13847,7 +14284,10 @@
         <a:buChar char="•"/>
         <a:defRPr sz="1350" kern="1200">
           <a:solidFill>
-            <a:schemeClr val="tx1"/>
+            <a:schemeClr val="tx2">
+              <a:lumMod val="75000"/>
+              <a:lumOff val="25000"/>
+            </a:schemeClr>
           </a:solidFill>
           <a:latin typeface="+mn-lt"/>
           <a:ea typeface="+mn-ea"/>
@@ -13865,7 +14305,10 @@
         <a:buChar char="•"/>
         <a:defRPr sz="1350" kern="1200">
           <a:solidFill>
-            <a:schemeClr val="tx1"/>
+            <a:schemeClr val="tx2">
+              <a:lumMod val="75000"/>
+              <a:lumOff val="25000"/>
+            </a:schemeClr>
           </a:solidFill>
           <a:latin typeface="+mn-lt"/>
           <a:ea typeface="+mn-ea"/>
@@ -14050,9 +14493,7 @@
     <p:bg>
       <p:bgPr>
         <a:solidFill>
-          <a:schemeClr val="accent1">
-            <a:alpha val="80000"/>
-          </a:schemeClr>
+          <a:srgbClr val="00DBD0"/>
         </a:solidFill>
         <a:effectLst/>
       </p:bgPr>
@@ -15022,8 +15463,8 @@
         </p:nvSpPr>
         <p:spPr>
           <a:xfrm>
-            <a:off x="384035" y="1387318"/>
-            <a:ext cx="4572000" cy="307777"/>
+            <a:off x="467747" y="1077285"/>
+            <a:ext cx="4572000" cy="646331"/>
           </a:xfrm>
           <a:prstGeom prst="rect">
             <a:avLst/>
@@ -15040,7 +15481,11 @@
               <a:buNone/>
             </a:pPr>
             <a:r>
-              <a:rPr lang="fr-FR" b="1" u="sng" dirty="0"/>
+              <a:rPr lang="fr-FR" b="1" u="sng" dirty="0">
+                <a:solidFill>
+                  <a:schemeClr val="tx2"/>
+                </a:solidFill>
+              </a:rPr>
               <a:t>PRÉSENTATION D’AMAZON &amp; ÉCOSYSTÈME</a:t>
             </a:r>
           </a:p>
@@ -15180,8 +15625,8 @@
         </p:nvSpPr>
         <p:spPr>
           <a:xfrm>
-            <a:off x="384035" y="1005102"/>
-            <a:ext cx="4572000" cy="738664"/>
+            <a:off x="384035" y="912738"/>
+            <a:ext cx="4572000" cy="923330"/>
           </a:xfrm>
           <a:prstGeom prst="rect">
             <a:avLst/>
@@ -15198,7 +15643,11 @@
               <a:buNone/>
             </a:pPr>
             <a:r>
-              <a:rPr lang="fr-FR" b="1" dirty="0"/>
+              <a:rPr lang="fr-FR" b="1" dirty="0">
+                <a:solidFill>
+                  <a:schemeClr val="tx2"/>
+                </a:solidFill>
+              </a:rPr>
               <a:t>ANALYSE STRATÉGIQUE (SWOT)</a:t>
             </a:r>
           </a:p>
@@ -17967,7 +18416,18 @@
             </a:pPr>
             <a:r>
               <a:rPr lang="fr-FR" dirty="0"/>
-              <a:t> Introduction &amp; contexte du projet</a:t>
+              <a:t> </a:t>
+            </a:r>
+            <a:r>
+              <a:rPr lang="fr-FR" dirty="0">
+                <a:solidFill>
+                  <a:schemeClr val="tx2">
+                    <a:lumMod val="75000"/>
+                    <a:lumOff val="25000"/>
+                  </a:schemeClr>
+                </a:solidFill>
+              </a:rPr>
+              <a:t>Introduction &amp; contexte du projet</a:t>
             </a:r>
           </a:p>
           <a:p>
@@ -17975,7 +18435,14 @@
               <a:buFont typeface="+mj-lt"/>
               <a:buAutoNum type="arabicPeriod"/>
             </a:pPr>
-            <a:endParaRPr lang="fr-FR" dirty="0"/>
+            <a:endParaRPr lang="fr-FR" dirty="0">
+              <a:solidFill>
+                <a:schemeClr val="tx2">
+                  <a:lumMod val="75000"/>
+                  <a:lumOff val="25000"/>
+                </a:schemeClr>
+              </a:solidFill>
+            </a:endParaRPr>
           </a:p>
           <a:p>
             <a:pPr>
@@ -17983,7 +18450,14 @@
               <a:buAutoNum type="arabicPeriod"/>
             </a:pPr>
             <a:r>
-              <a:rPr lang="fr-FR" dirty="0"/>
+              <a:rPr lang="fr-FR" dirty="0">
+                <a:solidFill>
+                  <a:schemeClr val="tx2">
+                    <a:lumMod val="75000"/>
+                    <a:lumOff val="25000"/>
+                  </a:schemeClr>
+                </a:solidFill>
+              </a:rPr>
               <a:t> Analyse stratégique et identification du besoin</a:t>
             </a:r>
           </a:p>
@@ -17992,7 +18466,14 @@
               <a:buFont typeface="+mj-lt"/>
               <a:buAutoNum type="arabicPeriod"/>
             </a:pPr>
-            <a:endParaRPr lang="fr-FR" dirty="0"/>
+            <a:endParaRPr lang="fr-FR" dirty="0">
+              <a:solidFill>
+                <a:schemeClr val="tx2">
+                  <a:lumMod val="75000"/>
+                  <a:lumOff val="25000"/>
+                </a:schemeClr>
+              </a:solidFill>
+            </a:endParaRPr>
           </a:p>
           <a:p>
             <a:pPr>
@@ -18000,7 +18481,14 @@
               <a:buAutoNum type="arabicPeriod"/>
             </a:pPr>
             <a:r>
-              <a:rPr lang="fr-FR" dirty="0"/>
+              <a:rPr lang="fr-FR" dirty="0">
+                <a:solidFill>
+                  <a:schemeClr val="tx2">
+                    <a:lumMod val="75000"/>
+                    <a:lumOff val="25000"/>
+                  </a:schemeClr>
+                </a:solidFill>
+              </a:rPr>
               <a:t> Architecture data globale</a:t>
             </a:r>
           </a:p>
@@ -18009,7 +18497,14 @@
               <a:buFont typeface="+mj-lt"/>
               <a:buAutoNum type="arabicPeriod"/>
             </a:pPr>
-            <a:endParaRPr lang="fr-FR" dirty="0"/>
+            <a:endParaRPr lang="fr-FR" dirty="0">
+              <a:solidFill>
+                <a:schemeClr val="tx2">
+                  <a:lumMod val="75000"/>
+                  <a:lumOff val="25000"/>
+                </a:schemeClr>
+              </a:solidFill>
+            </a:endParaRPr>
           </a:p>
           <a:p>
             <a:pPr>
@@ -18017,7 +18512,14 @@
               <a:buAutoNum type="arabicPeriod"/>
             </a:pPr>
             <a:r>
-              <a:rPr lang="fr-FR" dirty="0"/>
+              <a:rPr lang="fr-FR" dirty="0">
+                <a:solidFill>
+                  <a:schemeClr val="tx2">
+                    <a:lumMod val="75000"/>
+                    <a:lumOff val="25000"/>
+                  </a:schemeClr>
+                </a:solidFill>
+              </a:rPr>
               <a:t> Data Engineering &amp; pipelines</a:t>
             </a:r>
           </a:p>
@@ -18026,7 +18528,14 @@
               <a:buFont typeface="+mj-lt"/>
               <a:buAutoNum type="arabicPeriod"/>
             </a:pPr>
-            <a:endParaRPr lang="fr-FR" dirty="0"/>
+            <a:endParaRPr lang="fr-FR" dirty="0">
+              <a:solidFill>
+                <a:schemeClr val="tx2">
+                  <a:lumMod val="75000"/>
+                  <a:lumOff val="25000"/>
+                </a:schemeClr>
+              </a:solidFill>
+            </a:endParaRPr>
           </a:p>
           <a:p>
             <a:pPr>
@@ -18034,7 +18543,14 @@
               <a:buAutoNum type="arabicPeriod"/>
             </a:pPr>
             <a:r>
-              <a:rPr lang="fr-FR" dirty="0"/>
+              <a:rPr lang="fr-FR" dirty="0">
+                <a:solidFill>
+                  <a:schemeClr val="tx2">
+                    <a:lumMod val="75000"/>
+                    <a:lumOff val="25000"/>
+                  </a:schemeClr>
+                </a:solidFill>
+              </a:rPr>
               <a:t> Analyse avancée des avis &amp; NLP</a:t>
             </a:r>
           </a:p>
@@ -18043,7 +18559,14 @@
               <a:buFont typeface="+mj-lt"/>
               <a:buAutoNum type="arabicPeriod"/>
             </a:pPr>
-            <a:endParaRPr lang="fr-FR" dirty="0"/>
+            <a:endParaRPr lang="fr-FR" dirty="0">
+              <a:solidFill>
+                <a:schemeClr val="tx2">
+                  <a:lumMod val="75000"/>
+                  <a:lumOff val="25000"/>
+                </a:schemeClr>
+              </a:solidFill>
+            </a:endParaRPr>
           </a:p>
           <a:p>
             <a:pPr>
@@ -18051,7 +18574,14 @@
               <a:buAutoNum type="arabicPeriod"/>
             </a:pPr>
             <a:r>
-              <a:rPr lang="fr-FR" dirty="0"/>
+              <a:rPr lang="fr-FR" dirty="0">
+                <a:solidFill>
+                  <a:schemeClr val="tx2">
+                    <a:lumMod val="75000"/>
+                    <a:lumOff val="25000"/>
+                  </a:schemeClr>
+                </a:solidFill>
+              </a:rPr>
               <a:t> Gouvernance, déploiement &amp; pilotage</a:t>
             </a:r>
           </a:p>
@@ -18060,7 +18590,14 @@
               <a:buFont typeface="+mj-lt"/>
               <a:buAutoNum type="arabicPeriod"/>
             </a:pPr>
-            <a:endParaRPr lang="fr-FR" dirty="0"/>
+            <a:endParaRPr lang="fr-FR" dirty="0">
+              <a:solidFill>
+                <a:schemeClr val="tx2">
+                  <a:lumMod val="75000"/>
+                  <a:lumOff val="25000"/>
+                </a:schemeClr>
+              </a:solidFill>
+            </a:endParaRPr>
           </a:p>
           <a:p>
             <a:pPr>
@@ -18068,7 +18605,14 @@
               <a:buAutoNum type="arabicPeriod"/>
             </a:pPr>
             <a:r>
-              <a:rPr lang="fr-FR" dirty="0"/>
+              <a:rPr lang="fr-FR" dirty="0">
+                <a:solidFill>
+                  <a:schemeClr val="tx2">
+                    <a:lumMod val="75000"/>
+                    <a:lumOff val="25000"/>
+                  </a:schemeClr>
+                </a:solidFill>
+              </a:rPr>
               <a:t> Conclusion &amp; perspective</a:t>
             </a:r>
           </a:p>
@@ -18096,7 +18640,7 @@
         <p:spPr>
           <a:xfrm>
             <a:off x="2133600" y="318014"/>
-            <a:ext cx="4572000" cy="307777"/>
+            <a:ext cx="5252434" cy="523220"/>
           </a:xfrm>
           <a:prstGeom prst="rect">
             <a:avLst/>
@@ -18113,10 +18657,16 @@
               <a:buNone/>
             </a:pPr>
             <a:r>
-              <a:rPr lang="fr-FR" b="1" u="sng"/>
+              <a:rPr lang="fr-FR" sz="2800" b="1" u="sng" dirty="0">
+                <a:solidFill>
+                  <a:schemeClr val="tx2">
+                    <a:lumMod val="75000"/>
+                    <a:lumOff val="25000"/>
+                  </a:schemeClr>
+                </a:solidFill>
+              </a:rPr>
               <a:t>PLAN DE LA PRÉSENTATION</a:t>
             </a:r>
-            <a:endParaRPr lang="fr-FR" b="1" u="sng" dirty="0"/>
           </a:p>
         </p:txBody>
       </p:sp>
@@ -18373,9 +18923,7 @@
     <p:bg>
       <p:bgPr>
         <a:solidFill>
-          <a:schemeClr val="accent1">
-            <a:alpha val="80000"/>
-          </a:schemeClr>
+          <a:srgbClr val="00DBD0"/>
         </a:solidFill>
         <a:effectLst/>
       </p:bgPr>
@@ -20870,9 +21418,7 @@
     <p:bg>
       <p:bgPr>
         <a:solidFill>
-          <a:schemeClr val="accent1">
-            <a:alpha val="80000"/>
-          </a:schemeClr>
+          <a:srgbClr val="00DBD0"/>
         </a:solidFill>
         <a:effectLst/>
       </p:bgPr>
@@ -21787,9 +22333,7 @@
     <p:bg>
       <p:bgPr>
         <a:solidFill>
-          <a:schemeClr val="accent1">
-            <a:alpha val="80000"/>
-          </a:schemeClr>
+          <a:srgbClr val="00DBD0"/>
         </a:solidFill>
         <a:effectLst/>
       </p:bgPr>
@@ -25264,9 +25808,7 @@
     <p:bg>
       <p:bgPr>
         <a:solidFill>
-          <a:schemeClr val="accent1">
-            <a:alpha val="80000"/>
-          </a:schemeClr>
+          <a:srgbClr val="00DBD0"/>
         </a:solidFill>
         <a:effectLst/>
       </p:bgPr>
@@ -28820,9 +29362,7 @@
     <p:bg>
       <p:bgPr>
         <a:solidFill>
-          <a:schemeClr val="accent1">
-            <a:alpha val="80000"/>
-          </a:schemeClr>
+          <a:srgbClr val="00DBD0"/>
         </a:solidFill>
         <a:effectLst/>
       </p:bgPr>
@@ -32145,9 +32685,7 @@
     <p:bg>
       <p:bgPr>
         <a:solidFill>
-          <a:schemeClr val="accent1">
-            <a:alpha val="80000"/>
-          </a:schemeClr>
+          <a:srgbClr val="00DBD0"/>
         </a:solidFill>
         <a:effectLst/>
       </p:bgPr>
@@ -34219,9 +34757,7 @@
     <p:bg>
       <p:bgPr>
         <a:solidFill>
-          <a:schemeClr val="accent1">
-            <a:alpha val="80000"/>
-          </a:schemeClr>
+          <a:srgbClr val="00DBD0"/>
         </a:solidFill>
         <a:effectLst/>
       </p:bgPr>

</xml_diff>